<commit_message>
warm back and modify.
</commit_message>
<xml_diff>
--- a/1_deepwalk/deepwalk.pptx
+++ b/1_deepwalk/deepwalk.pptx
@@ -214,7 +214,7 @@
           <a:p>
             <a:fld id="{90CFEA02-8822-4D13-9DAA-0D1CF00E99ED}" type="datetimeFigureOut">
               <a:rPr lang="zh-CN" altLang="en-US" smtClean="0"/>
-              <a:t>2021/9/16</a:t>
+              <a:t>2021/9/17</a:t>
             </a:fld>
             <a:endParaRPr lang="zh-CN" altLang="en-US"/>
           </a:p>
@@ -812,7 +812,7 @@
           <a:p>
             <a:fld id="{0B3207B4-5D25-4EF4-A88C-C57336970A58}" type="datetimeFigureOut">
               <a:rPr lang="zh-CN" altLang="en-US" smtClean="0"/>
-              <a:t>2021/9/16</a:t>
+              <a:t>2021/9/17</a:t>
             </a:fld>
             <a:endParaRPr lang="zh-CN" altLang="en-US"/>
           </a:p>
@@ -1010,7 +1010,7 @@
           <a:p>
             <a:fld id="{0B3207B4-5D25-4EF4-A88C-C57336970A58}" type="datetimeFigureOut">
               <a:rPr lang="zh-CN" altLang="en-US" smtClean="0"/>
-              <a:t>2021/9/16</a:t>
+              <a:t>2021/9/17</a:t>
             </a:fld>
             <a:endParaRPr lang="zh-CN" altLang="en-US"/>
           </a:p>
@@ -1218,7 +1218,7 @@
           <a:p>
             <a:fld id="{0B3207B4-5D25-4EF4-A88C-C57336970A58}" type="datetimeFigureOut">
               <a:rPr lang="zh-CN" altLang="en-US" smtClean="0"/>
-              <a:t>2021/9/16</a:t>
+              <a:t>2021/9/17</a:t>
             </a:fld>
             <a:endParaRPr lang="zh-CN" altLang="en-US"/>
           </a:p>
@@ -1416,7 +1416,7 @@
           <a:p>
             <a:fld id="{0B3207B4-5D25-4EF4-A88C-C57336970A58}" type="datetimeFigureOut">
               <a:rPr lang="zh-CN" altLang="en-US" smtClean="0"/>
-              <a:t>2021/9/16</a:t>
+              <a:t>2021/9/17</a:t>
             </a:fld>
             <a:endParaRPr lang="zh-CN" altLang="en-US"/>
           </a:p>
@@ -1691,7 +1691,7 @@
           <a:p>
             <a:fld id="{0B3207B4-5D25-4EF4-A88C-C57336970A58}" type="datetimeFigureOut">
               <a:rPr lang="zh-CN" altLang="en-US" smtClean="0"/>
-              <a:t>2021/9/16</a:t>
+              <a:t>2021/9/17</a:t>
             </a:fld>
             <a:endParaRPr lang="zh-CN" altLang="en-US"/>
           </a:p>
@@ -1956,7 +1956,7 @@
           <a:p>
             <a:fld id="{0B3207B4-5D25-4EF4-A88C-C57336970A58}" type="datetimeFigureOut">
               <a:rPr lang="zh-CN" altLang="en-US" smtClean="0"/>
-              <a:t>2021/9/16</a:t>
+              <a:t>2021/9/17</a:t>
             </a:fld>
             <a:endParaRPr lang="zh-CN" altLang="en-US"/>
           </a:p>
@@ -2368,7 +2368,7 @@
           <a:p>
             <a:fld id="{0B3207B4-5D25-4EF4-A88C-C57336970A58}" type="datetimeFigureOut">
               <a:rPr lang="zh-CN" altLang="en-US" smtClean="0"/>
-              <a:t>2021/9/16</a:t>
+              <a:t>2021/9/17</a:t>
             </a:fld>
             <a:endParaRPr lang="zh-CN" altLang="en-US"/>
           </a:p>
@@ -2509,7 +2509,7 @@
           <a:p>
             <a:fld id="{0B3207B4-5D25-4EF4-A88C-C57336970A58}" type="datetimeFigureOut">
               <a:rPr lang="zh-CN" altLang="en-US" smtClean="0"/>
-              <a:t>2021/9/16</a:t>
+              <a:t>2021/9/17</a:t>
             </a:fld>
             <a:endParaRPr lang="zh-CN" altLang="en-US"/>
           </a:p>
@@ -2622,7 +2622,7 @@
           <a:p>
             <a:fld id="{0B3207B4-5D25-4EF4-A88C-C57336970A58}" type="datetimeFigureOut">
               <a:rPr lang="zh-CN" altLang="en-US" smtClean="0"/>
-              <a:t>2021/9/16</a:t>
+              <a:t>2021/9/17</a:t>
             </a:fld>
             <a:endParaRPr lang="zh-CN" altLang="en-US"/>
           </a:p>
@@ -2933,7 +2933,7 @@
           <a:p>
             <a:fld id="{0B3207B4-5D25-4EF4-A88C-C57336970A58}" type="datetimeFigureOut">
               <a:rPr lang="zh-CN" altLang="en-US" smtClean="0"/>
-              <a:t>2021/9/16</a:t>
+              <a:t>2021/9/17</a:t>
             </a:fld>
             <a:endParaRPr lang="zh-CN" altLang="en-US"/>
           </a:p>
@@ -3221,7 +3221,7 @@
           <a:p>
             <a:fld id="{0B3207B4-5D25-4EF4-A88C-C57336970A58}" type="datetimeFigureOut">
               <a:rPr lang="zh-CN" altLang="en-US" smtClean="0"/>
-              <a:t>2021/9/16</a:t>
+              <a:t>2021/9/17</a:t>
             </a:fld>
             <a:endParaRPr lang="zh-CN" altLang="en-US"/>
           </a:p>
@@ -3462,7 +3462,7 @@
           <a:p>
             <a:fld id="{0B3207B4-5D25-4EF4-A88C-C57336970A58}" type="datetimeFigureOut">
               <a:rPr lang="zh-CN" altLang="en-US" smtClean="0"/>
-              <a:t>2021/9/16</a:t>
+              <a:t>2021/9/17</a:t>
             </a:fld>
             <a:endParaRPr lang="zh-CN" altLang="en-US"/>
           </a:p>
@@ -4621,52 +4621,6 @@
           </a:p>
         </p:txBody>
       </p:sp>
-      <p:cxnSp>
-        <p:nvCxnSpPr>
-          <p:cNvPr id="17" name="连接符: 肘形 16">
-            <a:extLst>
-              <a:ext uri="{FF2B5EF4-FFF2-40B4-BE49-F238E27FC236}">
-                <a16:creationId xmlns:a16="http://schemas.microsoft.com/office/drawing/2014/main" id="{1ECD52C1-83C1-44DB-A942-62E3D91DED18}"/>
-              </a:ext>
-            </a:extLst>
-          </p:cNvPr>
-          <p:cNvCxnSpPr>
-            <a:cxnSpLocks/>
-            <a:stCxn id="19" idx="2"/>
-            <a:endCxn id="24" idx="0"/>
-          </p:cNvCxnSpPr>
-          <p:nvPr/>
-        </p:nvCxnSpPr>
-        <p:spPr>
-          <a:xfrm rot="5400000">
-            <a:off x="2703058" y="3268813"/>
-            <a:ext cx="587552" cy="810243"/>
-          </a:xfrm>
-          <a:prstGeom prst="bentConnector3">
-            <a:avLst>
-              <a:gd name="adj1" fmla="val 50000"/>
-            </a:avLst>
-          </a:prstGeom>
-          <a:ln>
-            <a:headEnd type="triangle"/>
-            <a:tailEnd type="triangle"/>
-          </a:ln>
-        </p:spPr>
-        <p:style>
-          <a:lnRef idx="1">
-            <a:schemeClr val="accent1"/>
-          </a:lnRef>
-          <a:fillRef idx="0">
-            <a:schemeClr val="accent1"/>
-          </a:fillRef>
-          <a:effectRef idx="0">
-            <a:schemeClr val="accent1"/>
-          </a:effectRef>
-          <a:fontRef idx="minor">
-            <a:schemeClr val="tx1"/>
-          </a:fontRef>
-        </p:style>
-      </p:cxnSp>
       <p:sp>
         <p:nvSpPr>
           <p:cNvPr id="24" name="矩形 23">
@@ -4736,6 +4690,49 @@
           </a:prstGeom>
         </p:spPr>
       </p:pic>
+      <p:cxnSp>
+        <p:nvCxnSpPr>
+          <p:cNvPr id="3" name="连接符: 肘形 2">
+            <a:extLst>
+              <a:ext uri="{FF2B5EF4-FFF2-40B4-BE49-F238E27FC236}">
+                <a16:creationId xmlns:a16="http://schemas.microsoft.com/office/drawing/2014/main" id="{C4B83294-F8BA-492D-AD6C-D9F368C7EAC8}"/>
+              </a:ext>
+            </a:extLst>
+          </p:cNvPr>
+          <p:cNvCxnSpPr>
+            <a:cxnSpLocks/>
+            <a:stCxn id="19" idx="2"/>
+            <a:endCxn id="24" idx="0"/>
+          </p:cNvCxnSpPr>
+          <p:nvPr/>
+        </p:nvCxnSpPr>
+        <p:spPr>
+          <a:xfrm rot="5400000">
+            <a:off x="2703058" y="3268813"/>
+            <a:ext cx="587552" cy="810243"/>
+          </a:xfrm>
+          <a:prstGeom prst="bentConnector3">
+            <a:avLst/>
+          </a:prstGeom>
+          <a:ln>
+            <a:tailEnd type="triangle"/>
+          </a:ln>
+        </p:spPr>
+        <p:style>
+          <a:lnRef idx="1">
+            <a:schemeClr val="accent1"/>
+          </a:lnRef>
+          <a:fillRef idx="0">
+            <a:schemeClr val="accent1"/>
+          </a:fillRef>
+          <a:effectRef idx="0">
+            <a:schemeClr val="accent1"/>
+          </a:effectRef>
+          <a:fontRef idx="minor">
+            <a:schemeClr val="tx1"/>
+          </a:fontRef>
+        </p:style>
+      </p:cxnSp>
     </p:spTree>
     <p:extLst>
       <p:ext uri="{BB962C8B-B14F-4D97-AF65-F5344CB8AC3E}">
@@ -10112,8 +10109,8 @@
           </a:p>
         </p:txBody>
       </p:sp>
-      <mc:AlternateContent xmlns:mc="http://schemas.openxmlformats.org/markup-compatibility/2006">
-        <mc:Choice xmlns:a14="http://schemas.microsoft.com/office/drawing/2010/main" Requires="a14">
+      <mc:AlternateContent xmlns:mc="http://schemas.openxmlformats.org/markup-compatibility/2006" xmlns:a14="http://schemas.microsoft.com/office/drawing/2010/main">
+        <mc:Choice Requires="a14">
           <p:sp>
             <p:nvSpPr>
               <p:cNvPr id="7" name="矩形 6">
@@ -10298,7 +10295,7 @@
             </p:txBody>
           </p:sp>
         </mc:Choice>
-        <mc:Fallback>
+        <mc:Fallback xmlns="">
           <p:sp>
             <p:nvSpPr>
               <p:cNvPr id="7" name="矩形 6">
@@ -10699,8 +10696,8 @@
           </a:p>
         </p:txBody>
       </p:sp>
-      <mc:AlternateContent xmlns:mc="http://schemas.openxmlformats.org/markup-compatibility/2006">
-        <mc:Choice xmlns:a14="http://schemas.microsoft.com/office/drawing/2010/main" Requires="a14">
+      <mc:AlternateContent xmlns:mc="http://schemas.openxmlformats.org/markup-compatibility/2006" xmlns:a14="http://schemas.microsoft.com/office/drawing/2010/main">
+        <mc:Choice Requires="a14">
           <p:sp>
             <p:nvSpPr>
               <p:cNvPr id="21" name="矩形 20">
@@ -10948,7 +10945,7 @@
             </p:txBody>
           </p:sp>
         </mc:Choice>
-        <mc:Fallback>
+        <mc:Fallback xmlns="">
           <p:sp>
             <p:nvSpPr>
               <p:cNvPr id="21" name="矩形 20">
@@ -11793,8 +11790,8 @@
           </a:fontRef>
         </p:style>
       </p:cxnSp>
-      <mc:AlternateContent xmlns:mc="http://schemas.openxmlformats.org/markup-compatibility/2006">
-        <mc:Choice xmlns:a14="http://schemas.microsoft.com/office/drawing/2010/main" Requires="a14">
+      <mc:AlternateContent xmlns:mc="http://schemas.openxmlformats.org/markup-compatibility/2006" xmlns:a14="http://schemas.microsoft.com/office/drawing/2010/main">
+        <mc:Choice Requires="a14">
           <p:sp>
             <p:nvSpPr>
               <p:cNvPr id="40" name="矩形 39">
@@ -11822,6 +11819,7 @@
               </a:bodyPr>
               <a:lstStyle/>
               <a:p>
+                <a:pPr/>
                 <a14:m>
                   <m:oMathPara xmlns:m="http://schemas.openxmlformats.org/officeDocument/2006/math">
                     <m:oMathParaPr>
@@ -11861,7 +11859,7 @@
             </p:txBody>
           </p:sp>
         </mc:Choice>
-        <mc:Fallback>
+        <mc:Fallback xmlns="">
           <p:sp>
             <p:nvSpPr>
               <p:cNvPr id="40" name="矩形 39">
@@ -11906,8 +11904,8 @@
           </p:sp>
         </mc:Fallback>
       </mc:AlternateContent>
-      <mc:AlternateContent xmlns:mc="http://schemas.openxmlformats.org/markup-compatibility/2006">
-        <mc:Choice xmlns:a14="http://schemas.microsoft.com/office/drawing/2010/main" Requires="a14">
+      <mc:AlternateContent xmlns:mc="http://schemas.openxmlformats.org/markup-compatibility/2006" xmlns:a14="http://schemas.microsoft.com/office/drawing/2010/main">
+        <mc:Choice Requires="a14">
           <p:sp>
             <p:nvSpPr>
               <p:cNvPr id="41" name="矩形 40">
@@ -11935,6 +11933,7 @@
               </a:bodyPr>
               <a:lstStyle/>
               <a:p>
+                <a:pPr/>
                 <a14:m>
                   <m:oMathPara xmlns:m="http://schemas.openxmlformats.org/officeDocument/2006/math">
                     <m:oMathParaPr>
@@ -11974,7 +11973,7 @@
             </p:txBody>
           </p:sp>
         </mc:Choice>
-        <mc:Fallback>
+        <mc:Fallback xmlns="">
           <p:sp>
             <p:nvSpPr>
               <p:cNvPr id="41" name="矩形 40">
@@ -12019,8 +12018,8 @@
           </p:sp>
         </mc:Fallback>
       </mc:AlternateContent>
-      <mc:AlternateContent xmlns:mc="http://schemas.openxmlformats.org/markup-compatibility/2006">
-        <mc:Choice xmlns:a14="http://schemas.microsoft.com/office/drawing/2010/main" Requires="a14">
+      <mc:AlternateContent xmlns:mc="http://schemas.openxmlformats.org/markup-compatibility/2006" xmlns:a14="http://schemas.microsoft.com/office/drawing/2010/main">
+        <mc:Choice Requires="a14">
           <p:sp>
             <p:nvSpPr>
               <p:cNvPr id="42" name="矩形 41">
@@ -12048,6 +12047,7 @@
               </a:bodyPr>
               <a:lstStyle/>
               <a:p>
+                <a:pPr/>
                 <a14:m>
                   <m:oMathPara xmlns:m="http://schemas.openxmlformats.org/officeDocument/2006/math">
                     <m:oMathParaPr>
@@ -12087,7 +12087,7 @@
             </p:txBody>
           </p:sp>
         </mc:Choice>
-        <mc:Fallback>
+        <mc:Fallback xmlns="">
           <p:sp>
             <p:nvSpPr>
               <p:cNvPr id="42" name="矩形 41">
@@ -12132,8 +12132,8 @@
           </p:sp>
         </mc:Fallback>
       </mc:AlternateContent>
-      <mc:AlternateContent xmlns:mc="http://schemas.openxmlformats.org/markup-compatibility/2006">
-        <mc:Choice xmlns:a14="http://schemas.microsoft.com/office/drawing/2010/main" Requires="a14">
+      <mc:AlternateContent xmlns:mc="http://schemas.openxmlformats.org/markup-compatibility/2006" xmlns:a14="http://schemas.microsoft.com/office/drawing/2010/main">
+        <mc:Choice Requires="a14">
           <p:sp>
             <p:nvSpPr>
               <p:cNvPr id="43" name="矩形 42">
@@ -12161,6 +12161,7 @@
               </a:bodyPr>
               <a:lstStyle/>
               <a:p>
+                <a:pPr/>
                 <a14:m>
                   <m:oMathPara xmlns:m="http://schemas.openxmlformats.org/officeDocument/2006/math">
                     <m:oMathParaPr>
@@ -12200,7 +12201,7 @@
             </p:txBody>
           </p:sp>
         </mc:Choice>
-        <mc:Fallback>
+        <mc:Fallback xmlns="">
           <p:sp>
             <p:nvSpPr>
               <p:cNvPr id="43" name="矩形 42">
@@ -12245,8 +12246,8 @@
           </p:sp>
         </mc:Fallback>
       </mc:AlternateContent>
-      <mc:AlternateContent xmlns:mc="http://schemas.openxmlformats.org/markup-compatibility/2006">
-        <mc:Choice xmlns:a14="http://schemas.microsoft.com/office/drawing/2010/main" Requires="a14">
+      <mc:AlternateContent xmlns:mc="http://schemas.openxmlformats.org/markup-compatibility/2006" xmlns:a14="http://schemas.microsoft.com/office/drawing/2010/main">
+        <mc:Choice Requires="a14">
           <p:sp>
             <p:nvSpPr>
               <p:cNvPr id="44" name="矩形 43">
@@ -12274,6 +12275,7 @@
               </a:bodyPr>
               <a:lstStyle/>
               <a:p>
+                <a:pPr/>
                 <a14:m>
                   <m:oMathPara xmlns:m="http://schemas.openxmlformats.org/officeDocument/2006/math">
                     <m:oMathParaPr>
@@ -12313,7 +12315,7 @@
             </p:txBody>
           </p:sp>
         </mc:Choice>
-        <mc:Fallback>
+        <mc:Fallback xmlns="">
           <p:sp>
             <p:nvSpPr>
               <p:cNvPr id="44" name="矩形 43">
@@ -12448,8 +12450,8 @@
           </a:p>
         </p:txBody>
       </p:sp>
-      <mc:AlternateContent xmlns:mc="http://schemas.openxmlformats.org/markup-compatibility/2006">
-        <mc:Choice xmlns:a14="http://schemas.microsoft.com/office/drawing/2010/main" Requires="a14">
+      <mc:AlternateContent xmlns:mc="http://schemas.openxmlformats.org/markup-compatibility/2006" xmlns:a14="http://schemas.microsoft.com/office/drawing/2010/main">
+        <mc:Choice Requires="a14">
           <p:sp>
             <p:nvSpPr>
               <p:cNvPr id="48" name="矩形 47">
@@ -12477,6 +12479,7 @@
               </a:bodyPr>
               <a:lstStyle/>
               <a:p>
+                <a:pPr/>
                 <a14:m>
                   <m:oMathPara xmlns:m="http://schemas.openxmlformats.org/officeDocument/2006/math">
                     <m:oMathParaPr>
@@ -12503,7 +12506,7 @@
             </p:txBody>
           </p:sp>
         </mc:Choice>
-        <mc:Fallback>
+        <mc:Fallback xmlns="">
           <p:sp>
             <p:nvSpPr>
               <p:cNvPr id="48" name="矩形 47">
@@ -12548,8 +12551,8 @@
           </p:sp>
         </mc:Fallback>
       </mc:AlternateContent>
-      <mc:AlternateContent xmlns:mc="http://schemas.openxmlformats.org/markup-compatibility/2006">
-        <mc:Choice xmlns:a14="http://schemas.microsoft.com/office/drawing/2010/main" Requires="a14">
+      <mc:AlternateContent xmlns:mc="http://schemas.openxmlformats.org/markup-compatibility/2006" xmlns:a14="http://schemas.microsoft.com/office/drawing/2010/main">
+        <mc:Choice Requires="a14">
           <p:sp>
             <p:nvSpPr>
               <p:cNvPr id="49" name="矩形 48">
@@ -12577,6 +12580,7 @@
               </a:bodyPr>
               <a:lstStyle/>
               <a:p>
+                <a:pPr/>
                 <a14:m>
                   <m:oMathPara xmlns:m="http://schemas.openxmlformats.org/officeDocument/2006/math">
                     <m:oMathParaPr>
@@ -12603,7 +12607,7 @@
             </p:txBody>
           </p:sp>
         </mc:Choice>
-        <mc:Fallback>
+        <mc:Fallback xmlns="">
           <p:sp>
             <p:nvSpPr>
               <p:cNvPr id="49" name="矩形 48">
@@ -12648,8 +12652,8 @@
           </p:sp>
         </mc:Fallback>
       </mc:AlternateContent>
-      <mc:AlternateContent xmlns:mc="http://schemas.openxmlformats.org/markup-compatibility/2006">
-        <mc:Choice xmlns:a14="http://schemas.microsoft.com/office/drawing/2010/main" Requires="a14">
+      <mc:AlternateContent xmlns:mc="http://schemas.openxmlformats.org/markup-compatibility/2006" xmlns:a14="http://schemas.microsoft.com/office/drawing/2010/main">
+        <mc:Choice Requires="a14">
           <p:sp>
             <p:nvSpPr>
               <p:cNvPr id="50" name="矩形 49">
@@ -12891,7 +12895,7 @@
             </p:txBody>
           </p:sp>
         </mc:Choice>
-        <mc:Fallback>
+        <mc:Fallback xmlns="">
           <p:sp>
             <p:nvSpPr>
               <p:cNvPr id="50" name="矩形 49">
@@ -12963,15 +12967,37 @@
           </a:bodyPr>
           <a:lstStyle/>
           <a:p>
+            <a:pPr marL="285750" indent="-285750">
+              <a:buFont typeface="Arial" panose="020B0604020202020204" pitchFamily="34" charset="0"/>
+              <a:buChar char="•"/>
+            </a:pPr>
             <a:r>
               <a:rPr lang="en-US" altLang="zh-CN" dirty="0">
                 <a:latin typeface="Times New Roman" panose="02020603050405020304" pitchFamily="18" charset="0"/>
                 <a:cs typeface="Times New Roman" panose="02020603050405020304" pitchFamily="18" charset="0"/>
               </a:rPr>
-              <a:t>Independent vertex order, better capture the ‘nearness’ provided by random walks.</a:t>
+              <a:t>Independent vertex order, better capture the ‘</a:t>
             </a:r>
-          </a:p>
-          <a:p>
+            <a:r>
+              <a:rPr lang="en-US" altLang="zh-CN" u="sng" dirty="0">
+                <a:latin typeface="Times New Roman" panose="02020603050405020304" pitchFamily="18" charset="0"/>
+                <a:cs typeface="Times New Roman" panose="02020603050405020304" pitchFamily="18" charset="0"/>
+              </a:rPr>
+              <a:t>nearness</a:t>
+            </a:r>
+            <a:r>
+              <a:rPr lang="en-US" altLang="zh-CN" dirty="0">
+                <a:latin typeface="Times New Roman" panose="02020603050405020304" pitchFamily="18" charset="0"/>
+                <a:cs typeface="Times New Roman" panose="02020603050405020304" pitchFamily="18" charset="0"/>
+              </a:rPr>
+              <a:t>’ provided by random walks.</a:t>
+            </a:r>
+          </a:p>
+          <a:p>
+            <a:pPr marL="285750" indent="-285750">
+              <a:buFont typeface="Arial" panose="020B0604020202020204" pitchFamily="34" charset="0"/>
+              <a:buChar char="•"/>
+            </a:pPr>
             <a:r>
               <a:rPr lang="en-US" altLang="zh-CN" dirty="0">
                 <a:latin typeface="Times New Roman" panose="02020603050405020304" pitchFamily="18" charset="0"/>
@@ -13073,8 +13099,8 @@
           </a:prstGeom>
         </p:spPr>
       </p:pic>
-      <mc:AlternateContent xmlns:mc="http://schemas.openxmlformats.org/markup-compatibility/2006">
-        <mc:Choice xmlns:a14="http://schemas.microsoft.com/office/drawing/2010/main" Requires="a14">
+      <mc:AlternateContent xmlns:mc="http://schemas.openxmlformats.org/markup-compatibility/2006" xmlns:a14="http://schemas.microsoft.com/office/drawing/2010/main">
+        <mc:Choice Requires="a14">
           <p:sp>
             <p:nvSpPr>
               <p:cNvPr id="6" name="矩形 5">
@@ -13172,7 +13198,7 @@
             </p:txBody>
           </p:sp>
         </mc:Choice>
-        <mc:Fallback>
+        <mc:Fallback xmlns="">
           <p:sp>
             <p:nvSpPr>
               <p:cNvPr id="6" name="矩形 5">

</xml_diff>